<commit_message>
Fix typo in Sample files slide
</commit_message>
<xml_diff>
--- a/presentations/netcdf-intro.pptx
+++ b/presentations/netcdf-intro.pptx
@@ -7315,6 +7315,13 @@
       <p:transition xmlns:p14="http://schemas.microsoft.com/office/powerpoint/2010/main" spd="slow"/>
     </mc:Fallback>
   </mc:AlternateContent>
+  <p:timing>
+    <p:tnLst>
+      <p:par>
+        <p:cTn xmlns:p14="http://schemas.microsoft.com/office/powerpoint/2010/main" id="1" dur="indefinite" restart="never" nodeType="tmRoot"/>
+      </p:par>
+    </p:tnLst>
+  </p:timing>
 </p:sld>
 </file>
 
@@ -8246,6 +8253,13 @@
       <p:transition xmlns:p14="http://schemas.microsoft.com/office/powerpoint/2010/main" spd="slow"/>
     </mc:Fallback>
   </mc:AlternateContent>
+  <p:timing>
+    <p:tnLst>
+      <p:par>
+        <p:cTn xmlns:p14="http://schemas.microsoft.com/office/powerpoint/2010/main" id="1" dur="indefinite" restart="never" nodeType="tmRoot"/>
+      </p:par>
+    </p:tnLst>
+  </p:timing>
 </p:sld>
 </file>
 
@@ -8299,6 +8313,13 @@
   <p:clrMapOvr>
     <a:masterClrMapping/>
   </p:clrMapOvr>
+  <p:timing>
+    <p:tnLst>
+      <p:par>
+        <p:cTn xmlns:p14="http://schemas.microsoft.com/office/powerpoint/2010/main" id="1" dur="indefinite" restart="never" nodeType="tmRoot"/>
+      </p:par>
+    </p:tnLst>
+  </p:timing>
 </p:sld>
 </file>
 
@@ -30764,7 +30785,7 @@
                 <a:latin typeface="Courier"/>
                 <a:cs typeface="Courier"/>
               </a:rPr>
-              <a:t>file.cdl</a:t>
+              <a:t>file.nc</a:t>
             </a:r>
             <a:endParaRPr lang="en-US" dirty="0">
               <a:latin typeface="Courier"/>
@@ -30942,6 +30963,43 @@
               </a:rPr>
               <a:t>)</a:t>
             </a:r>
+          </a:p>
+          <a:p>
+            <a:pPr marL="0" indent="0">
+              <a:buNone/>
+            </a:pPr>
+            <a:r>
+              <a:rPr lang="en-US" sz="2400" dirty="0">
+                <a:latin typeface="Courier"/>
+                <a:cs typeface="Courier"/>
+              </a:rPr>
+              <a:t> </a:t>
+            </a:r>
+            <a:r>
+              <a:rPr lang="en-US" sz="2400" dirty="0" smtClean="0">
+                <a:latin typeface="Courier"/>
+                <a:cs typeface="Courier"/>
+              </a:rPr>
+              <a:t> &gt;&gt;&gt; </a:t>
+            </a:r>
+            <a:r>
+              <a:rPr lang="en-US" sz="2400" dirty="0" err="1" smtClean="0">
+                <a:latin typeface="Courier"/>
+                <a:cs typeface="Courier"/>
+              </a:rPr>
+              <a:t>f.close</a:t>
+            </a:r>
+            <a:r>
+              <a:rPr lang="en-US" sz="2400" smtClean="0">
+                <a:latin typeface="Courier"/>
+                <a:cs typeface="Courier"/>
+              </a:rPr>
+              <a:t>()</a:t>
+            </a:r>
+            <a:endParaRPr lang="en-US" sz="2400" dirty="0" smtClean="0">
+              <a:latin typeface="Courier"/>
+              <a:cs typeface="Courier"/>
+            </a:endParaRPr>
           </a:p>
           <a:p>
             <a:pPr marL="0" indent="0">
@@ -31911,8 +31969,8 @@
               <a:t>variables in a test file, </a:t>
             </a:r>
             <a:r>
-              <a:rPr lang="en-US" sz="2000" dirty="0" err="1"/>
-              <a:t>test.nc</a:t>
+              <a:rPr lang="en-US" sz="2000" dirty="0" err="1" smtClean="0"/>
+              <a:t>testrh.nc</a:t>
             </a:r>
             <a:r>
               <a:rPr lang="en-US" sz="2000" dirty="0"/>
@@ -31969,12 +32027,61 @@
               <a:t> -d1 </a:t>
             </a:r>
             <a:r>
+              <a:rPr lang="en-US" sz="1600" dirty="0" err="1" smtClean="0">
+                <a:latin typeface="Courier" charset="0"/>
+                <a:cs typeface="Courier" charset="0"/>
+                <a:sym typeface="Courier" charset="0"/>
+              </a:rPr>
+              <a:t>testeh.nc</a:t>
+            </a:r>
+            <a:r>
+              <a:rPr lang="en-US" sz="1600" dirty="0" smtClean="0">
+                <a:latin typeface="Courier" charset="0"/>
+                <a:cs typeface="Courier" charset="0"/>
+                <a:sym typeface="Courier" charset="0"/>
+              </a:rPr>
+              <a:t> testrhd1</a:t>
+            </a:r>
+            <a:r>
+              <a:rPr lang="en-US" sz="1600" dirty="0">
+                <a:latin typeface="Courier" charset="0"/>
+                <a:cs typeface="Courier" charset="0"/>
+                <a:sym typeface="Courier" charset="0"/>
+              </a:rPr>
+              <a:t>.nc        # compress data, level 1</a:t>
+            </a:r>
+            <a:endParaRPr lang="en-US" sz="1600" dirty="0">
+              <a:latin typeface="Courier" charset="0"/>
+              <a:sym typeface="Courier" charset="0"/>
+            </a:endParaRPr>
+          </a:p>
+          <a:p>
+            <a:pPr>
+              <a:buFont typeface="Calibri" charset="0"/>
+              <a:buNone/>
+            </a:pPr>
+            <a:r>
+              <a:rPr lang="en-US" sz="1600" dirty="0">
+                <a:latin typeface="Courier" charset="0"/>
+                <a:sym typeface="Courier" charset="0"/>
+              </a:rPr>
+              <a:t>	</a:t>
+            </a:r>
+            <a:r>
+              <a:rPr lang="en-US" sz="1600" dirty="0">
+                <a:latin typeface="Courier" charset="0"/>
+                <a:cs typeface="Courier" charset="0"/>
+                <a:sym typeface="Courier" charset="0"/>
+              </a:rPr>
+              <a:t>$ </a:t>
+            </a:r>
+            <a:r>
               <a:rPr lang="en-US" sz="1600" dirty="0" err="1">
                 <a:latin typeface="Courier" charset="0"/>
                 <a:cs typeface="Courier" charset="0"/>
                 <a:sym typeface="Courier" charset="0"/>
               </a:rPr>
-              <a:t>test.nc</a:t>
+              <a:t>nccopy</a:t>
             </a:r>
             <a:r>
               <a:rPr lang="en-US" sz="1600" dirty="0">
@@ -31982,7 +32089,31 @@
                 <a:cs typeface="Courier" charset="0"/>
                 <a:sym typeface="Courier" charset="0"/>
               </a:rPr>
-              <a:t> testd1.nc        # compress data, level 1</a:t>
+              <a:t> -d1 -s </a:t>
+            </a:r>
+            <a:r>
+              <a:rPr lang="en-US" sz="1600" dirty="0" err="1" smtClean="0">
+                <a:latin typeface="Courier" charset="0"/>
+                <a:cs typeface="Courier" charset="0"/>
+                <a:sym typeface="Courier" charset="0"/>
+              </a:rPr>
+              <a:t>testrh.nc</a:t>
+            </a:r>
+            <a:r>
+              <a:rPr lang="en-US" sz="1600" dirty="0" smtClean="0">
+                <a:latin typeface="Courier" charset="0"/>
+                <a:cs typeface="Courier" charset="0"/>
+                <a:sym typeface="Courier" charset="0"/>
+              </a:rPr>
+              <a:t> testrhd1s.nc    </a:t>
+            </a:r>
+            <a:r>
+              <a:rPr lang="en-US" sz="1600" dirty="0">
+                <a:latin typeface="Courier" charset="0"/>
+                <a:cs typeface="Courier" charset="0"/>
+                <a:sym typeface="Courier" charset="0"/>
+              </a:rPr>
+              <a:t># shuffle and compress data</a:t>
             </a:r>
             <a:endParaRPr lang="en-US" sz="1600" dirty="0">
               <a:latin typeface="Courier" charset="0"/>
@@ -32015,7 +32146,7 @@
                 <a:cs typeface="Courier" charset="0"/>
                 <a:sym typeface="Courier" charset="0"/>
               </a:rPr>
-              <a:t>nccopy</a:t>
+              <a:t>ls</a:t>
             </a:r>
             <a:r>
               <a:rPr lang="en-US" sz="1600" dirty="0">
@@ -32023,15 +32154,23 @@
                 <a:cs typeface="Courier" charset="0"/>
                 <a:sym typeface="Courier" charset="0"/>
               </a:rPr>
-              <a:t> -d1 -s </a:t>
-            </a:r>
-            <a:r>
-              <a:rPr lang="en-US" sz="1600" dirty="0" err="1">
+              <a:t> -l </a:t>
+            </a:r>
+            <a:r>
+              <a:rPr lang="en-US" sz="1600" dirty="0" err="1" smtClean="0">
                 <a:latin typeface="Courier" charset="0"/>
                 <a:cs typeface="Courier" charset="0"/>
                 <a:sym typeface="Courier" charset="0"/>
               </a:rPr>
-              <a:t>test.nc</a:t>
+              <a:t>testrh.nc</a:t>
+            </a:r>
+            <a:r>
+              <a:rPr lang="en-US" sz="1600" dirty="0" smtClean="0">
+                <a:latin typeface="Courier" charset="0"/>
+                <a:cs typeface="Courier" charset="0"/>
+                <a:sym typeface="Courier" charset="0"/>
+              </a:rPr>
+              <a:t> testrhd1</a:t>
             </a:r>
             <a:r>
               <a:rPr lang="en-US" sz="1600" dirty="0">
@@ -32039,24 +32178,15 @@
                 <a:cs typeface="Courier" charset="0"/>
                 <a:sym typeface="Courier" charset="0"/>
               </a:rPr>
-              <a:t> testd1s.nc    # shuffle and compress data</a:t>
-            </a:r>
-            <a:endParaRPr lang="en-US" sz="1600" dirty="0">
-              <a:latin typeface="Courier" charset="0"/>
-              <a:sym typeface="Courier" charset="0"/>
-            </a:endParaRPr>
-          </a:p>
-          <a:p>
-            <a:pPr>
-              <a:buFont typeface="Calibri" charset="0"/>
-              <a:buNone/>
-            </a:pPr>
-            <a:r>
-              <a:rPr lang="en-US" sz="1600" dirty="0">
+              <a:t>.nc </a:t>
+            </a:r>
+            <a:r>
+              <a:rPr lang="en-US" sz="1600" dirty="0" smtClean="0">
                 <a:latin typeface="Courier" charset="0"/>
+                <a:cs typeface="Courier" charset="0"/>
                 <a:sym typeface="Courier" charset="0"/>
               </a:rPr>
-              <a:t>	</a:t>
+              <a:t>testrhd1s.nc  </a:t>
             </a:r>
             <a:r>
               <a:rPr lang="en-US" sz="1600" dirty="0">
@@ -32064,39 +32194,7 @@
                 <a:cs typeface="Courier" charset="0"/>
                 <a:sym typeface="Courier" charset="0"/>
               </a:rPr>
-              <a:t>$ </a:t>
-            </a:r>
-            <a:r>
-              <a:rPr lang="en-US" sz="1600" dirty="0" err="1">
-                <a:latin typeface="Courier" charset="0"/>
-                <a:cs typeface="Courier" charset="0"/>
-                <a:sym typeface="Courier" charset="0"/>
-              </a:rPr>
-              <a:t>ls</a:t>
-            </a:r>
-            <a:r>
-              <a:rPr lang="en-US" sz="1600" dirty="0">
-                <a:latin typeface="Courier" charset="0"/>
-                <a:cs typeface="Courier" charset="0"/>
-                <a:sym typeface="Courier" charset="0"/>
-              </a:rPr>
-              <a:t> -l </a:t>
-            </a:r>
-            <a:r>
-              <a:rPr lang="en-US" sz="1600" dirty="0" err="1">
-                <a:latin typeface="Courier" charset="0"/>
-                <a:cs typeface="Courier" charset="0"/>
-                <a:sym typeface="Courier" charset="0"/>
-              </a:rPr>
-              <a:t>test.nc</a:t>
-            </a:r>
-            <a:r>
-              <a:rPr lang="en-US" sz="1600" dirty="0">
-                <a:latin typeface="Courier" charset="0"/>
-                <a:cs typeface="Courier" charset="0"/>
-                <a:sym typeface="Courier" charset="0"/>
-              </a:rPr>
-              <a:t> testd1.nc testd1s.nc  # check </a:t>
+              <a:t># check </a:t>
             </a:r>
             <a:r>
               <a:rPr lang="en-US" sz="1600" dirty="0" smtClean="0">

</xml_diff>

<commit_message>
More updates to netCDF-Intro presentation
</commit_message>
<xml_diff>
--- a/presentations/netcdf-intro.pptx
+++ b/presentations/netcdf-intro.pptx
@@ -7400,7 +7400,7 @@
           <a:p>
             <a:pPr marL="39688" algn="ctr"/>
             <a:r>
-              <a:rPr lang="en-US" dirty="0">
+              <a:rPr lang="en-US" dirty="0" smtClean="0">
                 <a:solidFill>
                   <a:schemeClr val="tx1"/>
                 </a:solidFill>
@@ -7409,8 +7409,41 @@
                 <a:cs typeface="ＭＳ Ｐゴシック" charset="0"/>
                 <a:sym typeface="Calibri" charset="0"/>
               </a:rPr>
-              <a:t>21-22 October 2014</a:t>
-            </a:r>
+              <a:t>20-</a:t>
+            </a:r>
+            <a:r>
+              <a:rPr lang="en-US" dirty="0">
+                <a:solidFill>
+                  <a:schemeClr val="tx1"/>
+                </a:solidFill>
+                <a:latin typeface="Calibri" charset="0"/>
+                <a:ea typeface="ＭＳ Ｐゴシック" charset="0"/>
+                <a:cs typeface="ＭＳ Ｐゴシック" charset="0"/>
+                <a:sym typeface="Calibri" charset="0"/>
+              </a:rPr>
+              <a:t>22 </a:t>
+            </a:r>
+            <a:r>
+              <a:rPr lang="en-US" dirty="0" smtClean="0">
+                <a:solidFill>
+                  <a:schemeClr val="tx1"/>
+                </a:solidFill>
+                <a:latin typeface="Calibri" charset="0"/>
+                <a:ea typeface="ＭＳ Ｐゴシック" charset="0"/>
+                <a:cs typeface="ＭＳ Ｐゴシック" charset="0"/>
+                <a:sym typeface="Calibri" charset="0"/>
+              </a:rPr>
+              <a:t>July 2015</a:t>
+            </a:r>
+            <a:endParaRPr lang="en-US" dirty="0">
+              <a:solidFill>
+                <a:schemeClr val="tx1"/>
+              </a:solidFill>
+              <a:latin typeface="Calibri" charset="0"/>
+              <a:ea typeface="ＭＳ Ｐゴシック" charset="0"/>
+              <a:cs typeface="ＭＳ Ｐゴシック" charset="0"/>
+              <a:sym typeface="Calibri" charset="0"/>
+            </a:endParaRPr>
           </a:p>
         </p:txBody>
       </p:sp>
@@ -7489,8 +7522,8 @@
         </p:nvSpPr>
         <p:spPr>
           <a:xfrm>
-            <a:off x="457200" y="145690"/>
-            <a:ext cx="8229600" cy="844910"/>
+            <a:off x="228600" y="145690"/>
+            <a:ext cx="8686800" cy="844910"/>
           </a:xfrm>
         </p:spPr>
         <p:txBody>
@@ -7530,7 +7563,7 @@
         <p:spPr/>
         <p:txBody>
           <a:bodyPr rIns="132080">
-            <a:normAutofit lnSpcReduction="10000"/>
+            <a:normAutofit/>
           </a:bodyPr>
           <a:lstStyle/>
           <a:p>
@@ -7542,25 +7575,32 @@
                 <a:solidFill>
                   <a:schemeClr val="accent1"/>
                 </a:solidFill>
-                <a:cs typeface="Gill Sans"/>
+                <a:latin typeface="Gill Sans SemiBold"/>
+                <a:cs typeface="Gill Sans SemiBold"/>
                 <a:sym typeface="Calibri Bold" charset="0"/>
               </a:rPr>
-              <a:t>File</a:t>
+              <a:t>File </a:t>
             </a:r>
             <a:r>
               <a:rPr lang="en-US" dirty="0" smtClean="0">
                 <a:solidFill>
                   <a:schemeClr val="accent1"/>
                 </a:solidFill>
-                <a:cs typeface="Calibri Bold" charset="0"/>
+                <a:latin typeface="Gill Sans SemiBold"/>
+                <a:cs typeface="Gill Sans SemiBold"/>
                 <a:sym typeface="Calibri Bold" charset="0"/>
               </a:rPr>
-              <a:t> formats </a:t>
+              <a:t>formats: </a:t>
             </a:r>
             <a:r>
               <a:rPr lang="en-US" dirty="0" smtClean="0"/>
-              <a:t>for portable data and metadata</a:t>
-            </a:r>
+              <a:t>for </a:t>
+            </a:r>
+            <a:r>
+              <a:rPr lang="en-US" dirty="0" smtClean="0"/>
+              <a:t>making data &amp; metadata portable</a:t>
+            </a:r>
+            <a:endParaRPr lang="en-US" dirty="0" smtClean="0"/>
           </a:p>
           <a:p>
             <a:pPr marL="839788" lvl="1" indent="-342900">
@@ -7568,7 +7608,11 @@
             </a:pPr>
             <a:r>
               <a:rPr lang="en-US" sz="2000" dirty="0" smtClean="0"/>
-              <a:t>Support array-oriented scientific data and metadata</a:t>
+              <a:t>Supports sharing </a:t>
+            </a:r>
+            <a:r>
+              <a:rPr lang="en-US" sz="2000" dirty="0" smtClean="0"/>
+              <a:t>array-oriented scientific data and metadata</a:t>
             </a:r>
           </a:p>
           <a:p>
@@ -7576,16 +7620,20 @@
               <a:defRPr/>
             </a:pPr>
             <a:r>
-              <a:rPr lang="en-US" sz="2000" dirty="0"/>
-              <a:t>M</a:t>
-            </a:r>
-            <a:r>
               <a:rPr lang="en-US" sz="2000" dirty="0" smtClean="0"/>
-              <a:t>ake data </a:t>
+              <a:t>Provides data that is </a:t>
             </a:r>
             <a:r>
               <a:rPr lang="en-US" sz="2000" i="1" dirty="0" smtClean="0"/>
-              <a:t>self-describing, portable, scalable, remotely accessible, </a:t>
+              <a:t>self-describing, portable, scalable</a:t>
+            </a:r>
+            <a:r>
+              <a:rPr lang="en-US" sz="2000" i="1" dirty="0" smtClean="0"/>
+              <a:t>, extendible, </a:t>
+            </a:r>
+            <a:r>
+              <a:rPr lang="en-US" sz="2000" i="1" dirty="0" smtClean="0"/>
+              <a:t>remotely accessible, </a:t>
             </a:r>
             <a:r>
               <a:rPr lang="en-US" sz="2000" i="1" dirty="0" err="1" smtClean="0"/>
@@ -7614,18 +7662,26 @@
                 <a:solidFill>
                   <a:srgbClr val="00ACCE"/>
                 </a:solidFill>
-                <a:cs typeface="Calibri Bold" charset="0"/>
+                <a:latin typeface="Gill Sans SemiBold"/>
+                <a:cs typeface="Gill Sans SemiBold"/>
                 <a:sym typeface="Calibri Bold" charset="0"/>
               </a:rPr>
-              <a:t>Data models </a:t>
-            </a:r>
-            <a:r>
-              <a:rPr lang="en-US" dirty="0"/>
-              <a:t>for </a:t>
+              <a:t>Data </a:t>
+            </a:r>
+            <a:r>
+              <a:rPr lang="en-US" dirty="0" smtClean="0">
+                <a:solidFill>
+                  <a:srgbClr val="00ACCE"/>
+                </a:solidFill>
+                <a:latin typeface="Gill Sans SemiBold"/>
+                <a:cs typeface="Gill Sans SemiBold"/>
+                <a:sym typeface="Calibri Bold" charset="0"/>
+              </a:rPr>
+              <a:t>models: </a:t>
             </a:r>
             <a:r>
               <a:rPr lang="en-US" dirty="0" smtClean="0"/>
-              <a:t>geosciences</a:t>
+              <a:t>for faithfully representing science data</a:t>
             </a:r>
             <a:endParaRPr lang="en-US" dirty="0"/>
           </a:p>
@@ -7736,24 +7792,33 @@
                 <a:solidFill>
                   <a:srgbClr val="00ACCE"/>
                 </a:solidFill>
+                <a:latin typeface="Gill Sans SemiBold"/>
+                <a:cs typeface="Gill Sans SemiBold"/>
+                <a:sym typeface="Calibri Bold" charset="0"/>
+              </a:rPr>
+              <a:t>APIs:</a:t>
+            </a:r>
+            <a:r>
+              <a:rPr lang="en-US" b="1" dirty="0" smtClean="0">
+                <a:solidFill>
+                  <a:srgbClr val="660066"/>
+                </a:solidFill>
                 <a:cs typeface="Calibri Bold" charset="0"/>
                 <a:sym typeface="Calibri Bold" charset="0"/>
               </a:rPr>
-              <a:t>APIs</a:t>
-            </a:r>
-            <a:r>
-              <a:rPr lang="en-US" b="1" dirty="0" smtClean="0">
-                <a:solidFill>
-                  <a:srgbClr val="660066"/>
-                </a:solidFill>
-                <a:cs typeface="Calibri Bold" charset="0"/>
-                <a:sym typeface="Calibri Bold" charset="0"/>
-              </a:rPr>
               <a:t> </a:t>
             </a:r>
             <a:r>
               <a:rPr lang="en-US" dirty="0" smtClean="0"/>
-              <a:t>for building applications and services</a:t>
+              <a:t>for </a:t>
+            </a:r>
+            <a:r>
+              <a:rPr lang="en-US" dirty="0" smtClean="0"/>
+              <a:t>developing applications </a:t>
+            </a:r>
+            <a:r>
+              <a:rPr lang="en-US" dirty="0" smtClean="0"/>
+              <a:t>and services</a:t>
             </a:r>
             <a:endParaRPr lang="en-US" b="1" dirty="0" smtClean="0">
               <a:solidFill>
@@ -7782,7 +7847,36 @@
             </a:r>
             <a:r>
               <a:rPr lang="en-US" sz="2000" dirty="0" smtClean="0"/>
-              <a:t>and Java implementations.</a:t>
+              <a:t>and Java </a:t>
+            </a:r>
+            <a:r>
+              <a:rPr lang="en-US" sz="2000" dirty="0" smtClean="0"/>
+              <a:t>APIs.</a:t>
+            </a:r>
+          </a:p>
+          <a:p>
+            <a:pPr marL="782638" lvl="1">
+              <a:defRPr/>
+            </a:pPr>
+            <a:r>
+              <a:rPr lang="en-US" sz="2000" dirty="0" smtClean="0"/>
+              <a:t>Community developers support </a:t>
+            </a:r>
+            <a:r>
+              <a:rPr lang="en-US" sz="2000" dirty="0"/>
+              <a:t>and maintain </a:t>
+            </a:r>
+            <a:r>
+              <a:rPr lang="en-US" sz="2000" dirty="0" smtClean="0">
+                <a:solidFill>
+                  <a:schemeClr val="accent1"/>
+                </a:solidFill>
+              </a:rPr>
+              <a:t>Python API </a:t>
+            </a:r>
+            <a:r>
+              <a:rPr lang="en-US" sz="2000" dirty="0" smtClean="0"/>
+              <a:t>and others.</a:t>
             </a:r>
             <a:endParaRPr lang="en-US" sz="2000" dirty="0"/>
           </a:p>
@@ -7792,35 +7886,26 @@
             </a:pPr>
             <a:r>
               <a:rPr lang="en-US" sz="2000" dirty="0" smtClean="0"/>
-              <a:t>Unidata provides best-effort support for Fortran and C++ implementations.</a:t>
-            </a:r>
-          </a:p>
-          <a:p>
-            <a:pPr marL="782638" lvl="1">
-              <a:defRPr/>
-            </a:pPr>
+              <a:t>Unidata provides best-effort support for </a:t>
+            </a:r>
             <a:r>
               <a:rPr lang="en-US" sz="2000" dirty="0" smtClean="0"/>
-              <a:t>Open source community and 3</a:t>
-            </a:r>
-            <a:r>
-              <a:rPr lang="en-US" sz="2000" baseline="30000" dirty="0" smtClean="0"/>
-              <a:t>rd</a:t>
+              <a:t>Fortran and C</a:t>
             </a:r>
             <a:r>
               <a:rPr lang="en-US" sz="2000" dirty="0" smtClean="0"/>
-              <a:t> parties support and maintain other APIs, including netcdf4-python for </a:t>
-            </a:r>
-            <a:r>
-              <a:rPr lang="en-US" sz="2000" dirty="0" smtClean="0">
-                <a:solidFill>
-                  <a:schemeClr val="accent1"/>
-                </a:solidFill>
-              </a:rPr>
-              <a:t>Python</a:t>
-            </a:r>
-            <a:r>
-              <a:rPr lang="en-US" sz="2000" b="1" dirty="0" smtClean="0"/>
+              <a:t>+</a:t>
+            </a:r>
+            <a:r>
+              <a:rPr lang="en-US" sz="2000" dirty="0" smtClean="0"/>
+              <a:t>+ </a:t>
+            </a:r>
+            <a:r>
+              <a:rPr lang="en-US" sz="2000" dirty="0" smtClean="0"/>
+              <a:t>APIs</a:t>
+            </a:r>
+            <a:r>
+              <a:rPr lang="en-US" sz="2000" dirty="0" smtClean="0"/>
               <a:t>.</a:t>
             </a:r>
             <a:endParaRPr lang="en-US" sz="2000" dirty="0" smtClean="0"/>
@@ -7877,11 +7962,15 @@
           <a:p>
             <a:r>
               <a:rPr lang="en-US" dirty="0"/>
-              <a:t>n</a:t>
+              <a:t>N</a:t>
             </a:r>
             <a:r>
               <a:rPr lang="en-US" dirty="0" smtClean="0"/>
-              <a:t>etCDF formats</a:t>
+              <a:t>etCDF </a:t>
+            </a:r>
+            <a:r>
+              <a:rPr lang="en-US" dirty="0" smtClean="0"/>
+              <a:t>formats</a:t>
             </a:r>
             <a:endParaRPr lang="en-US" dirty="0"/>
           </a:p>
@@ -8032,7 +8121,15 @@
             </a:pPr>
             <a:r>
               <a:rPr lang="en-US" sz="2400" b="1" dirty="0" smtClean="0"/>
-              <a:t>Appendable:</a:t>
+              <a:t>Exte</a:t>
+            </a:r>
+            <a:r>
+              <a:rPr lang="en-US" sz="2400" b="1" dirty="0" smtClean="0"/>
+              <a:t>ndible</a:t>
+            </a:r>
+            <a:r>
+              <a:rPr lang="en-US" sz="2400" b="1" dirty="0" smtClean="0"/>
+              <a:t>:</a:t>
             </a:r>
             <a:r>
               <a:rPr lang="en-US" sz="2400" dirty="0" smtClean="0"/>
@@ -8044,7 +8141,19 @@
             </a:r>
             <a:r>
               <a:rPr lang="en-US" sz="2400" dirty="0" smtClean="0"/>
-              <a:t>new data efficiently without copying existing data. You can add new metadata without changing existing programs.</a:t>
+              <a:t>new data efficiently without copying existing data. You can add new metadata without </a:t>
+            </a:r>
+            <a:r>
+              <a:rPr lang="en-US" sz="2400" dirty="0" smtClean="0"/>
+              <a:t>break</a:t>
+            </a:r>
+            <a:r>
+              <a:rPr lang="en-US" sz="2400" dirty="0" smtClean="0"/>
+              <a:t>ing </a:t>
+            </a:r>
+            <a:r>
+              <a:rPr lang="en-US" sz="2400" dirty="0" smtClean="0"/>
+              <a:t>existing programs.</a:t>
             </a:r>
           </a:p>
         </p:txBody>
@@ -8129,19 +8238,29 @@
           </a:xfrm>
         </p:spPr>
         <p:txBody>
-          <a:bodyPr/>
+          <a:bodyPr>
+            <a:normAutofit/>
+          </a:bodyPr>
           <a:lstStyle/>
           <a:p>
             <a:pPr>
               <a:defRPr/>
             </a:pPr>
             <a:r>
-              <a:rPr lang="en-US" b="1" dirty="0" smtClean="0"/>
+              <a:rPr lang="en-US" sz="2400" b="1" dirty="0" smtClean="0"/>
               <a:t>Remotely accessible: </a:t>
             </a:r>
             <a:r>
-              <a:rPr lang="en-US" dirty="0" smtClean="0"/>
-              <a:t>You can access data in netCDF and other formats from remote servers using OPeNDAP protocols.</a:t>
+              <a:rPr lang="en-US" sz="2400" dirty="0" smtClean="0"/>
+              <a:t>You can access </a:t>
+            </a:r>
+            <a:r>
+              <a:rPr lang="en-US" sz="2400" dirty="0" smtClean="0"/>
+              <a:t>subsets of data </a:t>
+            </a:r>
+            <a:r>
+              <a:rPr lang="en-US" sz="2400" dirty="0" smtClean="0"/>
+              <a:t>in netCDF and other formats from remote servers using OPeNDAP protocols.</a:t>
             </a:r>
           </a:p>
           <a:p>
@@ -8149,19 +8268,19 @@
               <a:defRPr/>
             </a:pPr>
             <a:r>
-              <a:rPr lang="en-US" b="1" dirty="0" smtClean="0"/>
+              <a:rPr lang="en-US" sz="2400" b="1" dirty="0" smtClean="0"/>
               <a:t>Archivable:</a:t>
             </a:r>
             <a:r>
-              <a:rPr lang="en-US" dirty="0" smtClean="0"/>
+              <a:rPr lang="en-US" sz="2400" dirty="0" smtClean="0"/>
               <a:t> </a:t>
             </a:r>
             <a:r>
-              <a:rPr lang="en-US" dirty="0"/>
+              <a:rPr lang="en-US" sz="2400" dirty="0"/>
               <a:t>You can access </a:t>
             </a:r>
             <a:r>
-              <a:rPr lang="en-US" dirty="0" smtClean="0"/>
+              <a:rPr lang="en-US" sz="2400" dirty="0" smtClean="0"/>
               <a:t>earlier versions of netCDF formats using current and future versions of software.</a:t>
             </a:r>
           </a:p>
@@ -8170,15 +8289,15 @@
               <a:defRPr/>
             </a:pPr>
             <a:r>
-              <a:rPr lang="en-US" b="1" dirty="0" smtClean="0"/>
+              <a:rPr lang="en-US" sz="2400" b="1" dirty="0" smtClean="0"/>
               <a:t>Structured: </a:t>
             </a:r>
             <a:r>
-              <a:rPr lang="en-US" dirty="0"/>
+              <a:rPr lang="en-US" sz="2400" dirty="0"/>
               <a:t>You can </a:t>
             </a:r>
             <a:r>
-              <a:rPr lang="en-US" dirty="0" smtClean="0"/>
+              <a:rPr lang="en-US" sz="2400" dirty="0" smtClean="0"/>
               <a:t>use a variety of types and data structures to capture the meaning in your data.</a:t>
             </a:r>
           </a:p>
@@ -8186,7 +8305,7 @@
             <a:pPr>
               <a:defRPr/>
             </a:pPr>
-            <a:endParaRPr lang="en-US" dirty="0"/>
+            <a:endParaRPr lang="en-US" sz="2400" dirty="0"/>
           </a:p>
         </p:txBody>
       </p:sp>
@@ -8248,10 +8367,10 @@
             </a:pPr>
             <a:r>
               <a:rPr lang="en-US" dirty="0" smtClean="0"/>
-              <a:t>NetCDF </a:t>
-            </a:r>
-            <a:r>
-              <a:rPr lang="en-US" dirty="0" smtClean="0">
+              <a:t>NetCDF-3 </a:t>
+            </a:r>
+            <a:r>
+              <a:rPr lang="en-US" b="1" dirty="0" smtClean="0">
                 <a:latin typeface="Calibri Italic" charset="0"/>
                 <a:cs typeface="Calibri Italic" charset="0"/>
                 <a:sym typeface="Calibri Italic" charset="0"/>
@@ -8259,18 +8378,18 @@
               <a:t>classic</a:t>
             </a:r>
             <a:r>
-              <a:rPr lang="en-US" dirty="0" smtClean="0"/>
+              <a:rPr lang="en-US" b="1" dirty="0" smtClean="0"/>
               <a:t> </a:t>
             </a:r>
             <a:r>
-              <a:rPr lang="en-US" dirty="0" smtClean="0">
+              <a:rPr lang="en-US" b="1" dirty="0" smtClean="0">
                 <a:latin typeface="Calibri Italic" charset="0"/>
                 <a:cs typeface="Calibri Italic" charset="0"/>
                 <a:sym typeface="Calibri Italic" charset="0"/>
               </a:rPr>
-              <a:t>format</a:t>
-            </a:r>
-            <a:endParaRPr lang="en-US" dirty="0" smtClean="0">
+              <a:t>formats</a:t>
+            </a:r>
+            <a:endParaRPr lang="en-US" b="1" dirty="0" smtClean="0">
               <a:latin typeface="Calibri Italic" charset="0"/>
               <a:sym typeface="Calibri Italic" charset="0"/>
             </a:endParaRPr>
@@ -8386,7 +8505,15 @@
             </a:pPr>
             <a:r>
               <a:rPr lang="en-US" sz="2400" dirty="0" smtClean="0"/>
-              <a:t>Mature conventions and best practices available</a:t>
+              <a:t>Mature conventions and best </a:t>
+            </a:r>
+            <a:r>
+              <a:rPr lang="en-US" sz="2400" dirty="0" smtClean="0"/>
+              <a:t>practices (e.g. CF) </a:t>
+            </a:r>
+            <a:r>
+              <a:rPr lang="en-US" sz="2400" dirty="0" smtClean="0"/>
+              <a:t>available</a:t>
             </a:r>
           </a:p>
         </p:txBody>
@@ -8402,7 +8529,7 @@
         <p:spPr>
           <a:xfrm>
             <a:off x="4876800" y="1270250"/>
-            <a:ext cx="4032250" cy="4845050"/>
+            <a:ext cx="4032250" cy="4597150"/>
           </a:xfrm>
           <a:prstGeom prst="rect">
             <a:avLst/>
@@ -8671,7 +8798,16 @@
                 </a:solidFill>
                 <a:latin typeface="Gill Sans"/>
               </a:rPr>
-              <a:t>4 GiB limits on variable sizes</a:t>
+              <a:t>Some 4 </a:t>
+            </a:r>
+            <a:r>
+              <a:rPr lang="en-US" dirty="0" smtClean="0">
+                <a:solidFill>
+                  <a:schemeClr val="tx1"/>
+                </a:solidFill>
+                <a:latin typeface="Gill Sans"/>
+              </a:rPr>
+              <a:t>GiB limits on variable sizes</a:t>
             </a:r>
           </a:p>
           <a:p>
@@ -8754,14 +8890,14 @@
               <a:t>NetCDF-4 </a:t>
             </a:r>
             <a:r>
-              <a:rPr lang="en-US" dirty="0" smtClean="0">
+              <a:rPr lang="en-US" b="1" dirty="0" smtClean="0">
                 <a:latin typeface="Calibri Italic" charset="0"/>
                 <a:cs typeface="Calibri Italic" charset="0"/>
                 <a:sym typeface="Calibri Italic" charset="0"/>
               </a:rPr>
-              <a:t>format</a:t>
-            </a:r>
-            <a:endParaRPr lang="en-US" dirty="0" smtClean="0">
+              <a:t>formats</a:t>
+            </a:r>
+            <a:endParaRPr lang="en-US" b="1" dirty="0" smtClean="0">
               <a:latin typeface="Calibri Italic" charset="0"/>
               <a:sym typeface="Calibri Italic" charset="0"/>
             </a:endParaRPr>
@@ -8831,8 +8967,21 @@
             </a:pPr>
             <a:r>
               <a:rPr lang="en-US" sz="2200" dirty="0"/>
-              <a:t>Efficient compression from HDF5 storage</a:t>
-            </a:r>
+              <a:t>Efficient compression </a:t>
+            </a:r>
+            <a:r>
+              <a:rPr lang="en-US" sz="2200" dirty="0" smtClean="0"/>
+              <a:t>(using </a:t>
+            </a:r>
+            <a:r>
+              <a:rPr lang="en-US" sz="2200" dirty="0" err="1" smtClean="0"/>
+              <a:t>zlib</a:t>
+            </a:r>
+            <a:r>
+              <a:rPr lang="en-US" sz="2200" dirty="0" smtClean="0"/>
+              <a:t>, HDF5 storage)</a:t>
+            </a:r>
+            <a:endParaRPr lang="en-US" sz="2200" dirty="0"/>
           </a:p>
           <a:p>
             <a:pPr marL="782638" lvl="1">
@@ -8848,7 +8997,15 @@
             </a:pPr>
             <a:r>
               <a:rPr lang="en-US" sz="2200" dirty="0"/>
-              <a:t>Efficient access with HDF5 chunking</a:t>
+              <a:t>Efficient access </a:t>
+            </a:r>
+            <a:r>
+              <a:rPr lang="en-US" sz="2200" dirty="0" smtClean="0"/>
+              <a:t>using HDF5 </a:t>
+            </a:r>
+            <a:r>
+              <a:rPr lang="en-US" sz="2200" dirty="0"/>
+              <a:t>chunking</a:t>
             </a:r>
           </a:p>
           <a:p>
@@ -9008,7 +9165,15 @@
             </a:pPr>
             <a:r>
               <a:rPr lang="en-US" sz="2200" dirty="0"/>
-              <a:t>Chunking defaults often not appropriate, need careful tuning</a:t>
+              <a:t>Chunking defaults </a:t>
+            </a:r>
+            <a:r>
+              <a:rPr lang="en-US" sz="2200" dirty="0" smtClean="0"/>
+              <a:t>may </a:t>
+            </a:r>
+            <a:r>
+              <a:rPr lang="en-US" sz="2200" dirty="0"/>
+              <a:t>need careful tuning</a:t>
             </a:r>
           </a:p>
           <a:p>
@@ -9024,8 +9189,12 @@
               <a:defRPr/>
             </a:pPr>
             <a:r>
+              <a:rPr lang="en-US" sz="2200" dirty="0" smtClean="0"/>
+              <a:t>Complexity of </a:t>
+            </a:r>
+            <a:r>
               <a:rPr lang="en-US" sz="2200" dirty="0"/>
-              <a:t>Complex format discourages multiple implementations</a:t>
+              <a:t>format discourages multiple implementations</a:t>
             </a:r>
           </a:p>
           <a:p>
@@ -10049,8 +10218,16 @@
           <a:lstStyle/>
           <a:p>
             <a:r>
+              <a:rPr lang="en-US" dirty="0"/>
+              <a:t>N</a:t>
+            </a:r>
+            <a:r>
               <a:rPr lang="en-US" dirty="0" smtClean="0"/>
-              <a:t>netCDF data models</a:t>
+              <a:t>etCDF </a:t>
+            </a:r>
+            <a:r>
+              <a:rPr lang="en-US" dirty="0" smtClean="0"/>
+              <a:t>data models</a:t>
             </a:r>
             <a:endParaRPr lang="en-US" dirty="0"/>
           </a:p>
@@ -14811,7 +14988,7 @@
         </p:spPr>
         <p:txBody>
           <a:bodyPr>
-            <a:normAutofit fontScale="92500" lnSpcReduction="10000"/>
+            <a:normAutofit lnSpcReduction="10000"/>
           </a:bodyPr>
           <a:lstStyle/>
           <a:p>
@@ -14829,20 +15006,23 @@
           <a:p>
             <a:r>
               <a:rPr lang="en-US" dirty="0" smtClean="0"/>
-              <a:t>Application programming interfaces for C, Java, ...</a:t>
-            </a:r>
-          </a:p>
-          <a:p>
+              <a:t>Application programming interfaces for C</a:t>
+            </a:r>
             <a:r>
               <a:rPr lang="en-US" dirty="0" smtClean="0"/>
-              <a:t>Remote access with DAP</a:t>
-            </a:r>
-          </a:p>
-          <a:p>
+              <a:t>, Fortran. Python,  </a:t>
+            </a:r>
             <a:r>
               <a:rPr lang="en-US" dirty="0" smtClean="0"/>
-              <a:t>CF conventions</a:t>
-            </a:r>
+              <a:t>Java, ...</a:t>
+            </a:r>
+          </a:p>
+          <a:p>
+            <a:r>
+              <a:rPr lang="en-US" dirty="0" smtClean="0"/>
+              <a:t>CF metadata conventions</a:t>
+            </a:r>
+            <a:endParaRPr lang="en-US" dirty="0" smtClean="0"/>
           </a:p>
           <a:p>
             <a:r>
@@ -14906,8 +15086,18 @@
                   <a:schemeClr val="accent1"/>
                 </a:solidFill>
                 <a:latin typeface="Gill Sans"/>
-              </a:rPr>
-              <a:t>most recent netCDF workshop  </a:t>
+                <a:hlinkClick r:id="rId2"/>
+              </a:rPr>
+              <a:t>most recent netCDF workshop</a:t>
+            </a:r>
+            <a:r>
+              <a:rPr lang="en-US" dirty="0" smtClean="0">
+                <a:solidFill>
+                  <a:schemeClr val="accent1"/>
+                </a:solidFill>
+                <a:latin typeface="Gill Sans"/>
+              </a:rPr>
+              <a:t>  </a:t>
             </a:r>
             <a:r>
               <a:rPr lang="en-US" dirty="0" smtClean="0">
@@ -14975,7 +15165,9 @@
               <a:defRPr/>
             </a:pPr>
             <a:r>
-              <a:rPr lang="en-US" dirty="0" smtClean="0"/>
+              <a:rPr lang="en-US" dirty="0" smtClean="0">
+                <a:cs typeface="Gill Sans SemiBold"/>
+              </a:rPr>
               <a:t>The netCDF</a:t>
             </a:r>
             <a:r>
@@ -14983,47 +15175,40 @@
                 <a:solidFill>
                   <a:srgbClr val="A90000"/>
                 </a:solidFill>
-                <a:latin typeface="Gill Sans"/>
-                <a:cs typeface="Times" charset="0"/>
+                <a:cs typeface="Gill Sans SemiBold"/>
                 <a:sym typeface="Times" charset="0"/>
               </a:rPr>
               <a:t>-4</a:t>
             </a:r>
             <a:r>
+              <a:rPr lang="en-US" i="1" dirty="0" smtClean="0">
+                <a:cs typeface="Gill Sans SemiBold"/>
+              </a:rPr>
+              <a:t> </a:t>
+            </a:r>
+            <a:r>
+              <a:rPr lang="en-US" i="1" dirty="0" smtClean="0">
+                <a:solidFill>
+                  <a:srgbClr val="A90000"/>
+                </a:solidFill>
+                <a:cs typeface="Gill Sans SemiBold"/>
+                <a:sym typeface="Times" charset="0"/>
+              </a:rPr>
+              <a:t>enhanced</a:t>
+            </a:r>
+            <a:r>
+              <a:rPr lang="en-US" i="1" dirty="0" smtClean="0">
+                <a:cs typeface="Gill Sans SemiBold"/>
+              </a:rPr>
+              <a:t> </a:t>
+            </a:r>
+            <a:r>
               <a:rPr lang="en-US" dirty="0" smtClean="0">
-                <a:latin typeface="Gill Sans"/>
-              </a:rPr>
-              <a:t> </a:t>
-            </a:r>
-            <a:r>
-              <a:rPr lang="en-US" i="1" dirty="0" smtClean="0">
-                <a:solidFill>
-                  <a:srgbClr val="A90000"/>
-                </a:solidFill>
-                <a:latin typeface="Gill Sans"/>
-                <a:cs typeface="Times" charset="0"/>
-                <a:sym typeface="Times" charset="0"/>
-              </a:rPr>
-              <a:t>enhanced</a:t>
-            </a:r>
-            <a:r>
-              <a:rPr lang="en-US" dirty="0" smtClean="0">
-                <a:latin typeface="Gill Sans"/>
-              </a:rPr>
-              <a:t> </a:t>
-            </a:r>
-            <a:r>
-              <a:rPr lang="en-US" dirty="0" smtClean="0">
-                <a:latin typeface="Calibri Italic" charset="0"/>
-                <a:cs typeface="Calibri Italic" charset="0"/>
+                <a:cs typeface="Gill Sans SemiBold"/>
                 <a:sym typeface="Calibri Italic" charset="0"/>
               </a:rPr>
               <a:t>data model</a:t>
             </a:r>
-            <a:endParaRPr lang="en-US" dirty="0" smtClean="0">
-              <a:latin typeface="Calibri Italic" charset="0"/>
-              <a:sym typeface="Calibri Italic" charset="0"/>
-            </a:endParaRPr>
           </a:p>
         </p:txBody>
       </p:sp>
@@ -15073,7 +15258,7 @@
           <a:p>
             <a:pPr algn="ctr"/>
             <a:r>
-              <a:rPr lang="en-US" sz="1600" b="1" i="1" dirty="0">
+              <a:rPr lang="en-US" sz="1600" i="1" dirty="0">
                 <a:solidFill>
                   <a:schemeClr val="tx1"/>
                 </a:solidFill>
@@ -15085,7 +15270,7 @@
               <a:t>A file has </a:t>
             </a:r>
             <a:r>
-              <a:rPr lang="en-US" sz="1600" b="1" i="1" dirty="0">
+              <a:rPr lang="en-US" sz="1600" i="1" dirty="0">
                 <a:solidFill>
                   <a:srgbClr val="A90000"/>
                 </a:solidFill>
@@ -15097,7 +15282,7 @@
               <a:t>a top-level unnamed group.  Each group may contain one or more named subgroups, user-defined types,</a:t>
             </a:r>
             <a:r>
-              <a:rPr lang="en-US" sz="1600" b="1" i="1" dirty="0">
+              <a:rPr lang="en-US" sz="1600" i="1" dirty="0">
                 <a:solidFill>
                   <a:schemeClr val="tx1"/>
                 </a:solidFill>
@@ -15109,7 +15294,7 @@
               <a:t> variables, dimensions, and attributes.  Variables also have attributes.  Variables may share dimensions, indicating a common grid.  One </a:t>
             </a:r>
             <a:r>
-              <a:rPr lang="en-US" sz="1600" b="1" i="1" dirty="0">
+              <a:rPr lang="en-US" sz="1600" i="1" dirty="0">
                 <a:solidFill>
                   <a:srgbClr val="A90000"/>
                 </a:solidFill>
@@ -15121,7 +15306,7 @@
               <a:t>or more</a:t>
             </a:r>
             <a:r>
-              <a:rPr lang="en-US" sz="1600" b="1" i="1" dirty="0">
+              <a:rPr lang="en-US" sz="1600" i="1" dirty="0">
                 <a:solidFill>
                   <a:schemeClr val="tx1"/>
                 </a:solidFill>
@@ -15133,7 +15318,7 @@
               <a:t> dimension</a:t>
             </a:r>
             <a:r>
-              <a:rPr lang="en-US" sz="1600" b="1" i="1" dirty="0">
+              <a:rPr lang="en-US" sz="1600" i="1" dirty="0">
                 <a:solidFill>
                   <a:srgbClr val="A90000"/>
                 </a:solidFill>
@@ -15145,7 +15330,7 @@
               <a:t>s</a:t>
             </a:r>
             <a:r>
-              <a:rPr lang="en-US" sz="1600" b="1" i="1" dirty="0">
+              <a:rPr lang="en-US" sz="1600" i="1" dirty="0">
                 <a:solidFill>
                   <a:schemeClr val="tx1"/>
                 </a:solidFill>
@@ -15209,7 +15394,7 @@
               </a:spcBef>
             </a:pPr>
             <a:r>
-              <a:rPr lang="en-US" sz="1600" b="1" i="1" dirty="0">
+              <a:rPr lang="en-US" sz="1600" i="1" dirty="0">
                 <a:solidFill>
                   <a:schemeClr val="tx1"/>
                 </a:solidFill>
@@ -15221,7 +15406,7 @@
               <a:t>Variables and attributes have one of </a:t>
             </a:r>
             <a:r>
-              <a:rPr lang="en-US" sz="1600" b="1" i="1" dirty="0">
+              <a:rPr lang="en-US" sz="1600" i="1" dirty="0">
                 <a:solidFill>
                   <a:srgbClr val="A90000"/>
                 </a:solidFill>
@@ -15233,7 +15418,7 @@
               <a:t>twelve</a:t>
             </a:r>
             <a:r>
-              <a:rPr lang="en-US" sz="1600" b="1" i="1" dirty="0">
+              <a:rPr lang="en-US" sz="1600" i="1" dirty="0">
                 <a:solidFill>
                   <a:schemeClr val="tx1"/>
                 </a:solidFill>
@@ -15245,7 +15430,7 @@
               <a:t> primitive data types </a:t>
             </a:r>
             <a:r>
-              <a:rPr lang="en-US" sz="1600" b="1" i="1" dirty="0">
+              <a:rPr lang="en-US" sz="1600" i="1" dirty="0">
                 <a:solidFill>
                   <a:srgbClr val="A90000"/>
                 </a:solidFill>
@@ -15257,7 +15442,7 @@
               <a:t>or one of four user-defined types</a:t>
             </a:r>
             <a:r>
-              <a:rPr lang="en-US" sz="1600" b="1" i="1" dirty="0">
+              <a:rPr lang="en-US" sz="1600" i="1" dirty="0">
                 <a:solidFill>
                   <a:schemeClr val="tx1"/>
                 </a:solidFill>
@@ -20517,33 +20702,31 @@
               <a:defRPr/>
             </a:pPr>
             <a:r>
-              <a:rPr lang="en-US" dirty="0" smtClean="0"/>
+              <a:rPr lang="en-US" dirty="0" smtClean="0">
+                <a:cs typeface="Gill Sans SemiBold"/>
+              </a:rPr>
               <a:t>NetCDF </a:t>
             </a:r>
             <a:r>
               <a:rPr lang="en-US" dirty="0" smtClean="0">
-                <a:latin typeface="Calibri Italic" charset="0"/>
-                <a:cs typeface="Calibri Italic" charset="0"/>
+                <a:cs typeface="Gill Sans SemiBold"/>
                 <a:sym typeface="Calibri Italic" charset="0"/>
               </a:rPr>
               <a:t>classic</a:t>
             </a:r>
             <a:r>
-              <a:rPr lang="en-US" dirty="0" smtClean="0"/>
+              <a:rPr lang="en-US" dirty="0" smtClean="0">
+                <a:cs typeface="Gill Sans SemiBold"/>
+              </a:rPr>
               <a:t> </a:t>
             </a:r>
             <a:r>
               <a:rPr lang="en-US" dirty="0" smtClean="0">
-                <a:latin typeface="Calibri Italic" charset="0"/>
-                <a:cs typeface="Calibri Italic" charset="0"/>
+                <a:cs typeface="Gill Sans SemiBold"/>
                 <a:sym typeface="Calibri Italic" charset="0"/>
               </a:rPr>
               <a:t>data model</a:t>
             </a:r>
-            <a:endParaRPr lang="en-US" dirty="0" smtClean="0">
-              <a:latin typeface="Calibri Italic" charset="0"/>
-              <a:sym typeface="Calibri Italic" charset="0"/>
-            </a:endParaRPr>
           </a:p>
         </p:txBody>
       </p:sp>
@@ -20879,21 +21062,18 @@
               <a:defRPr/>
             </a:pPr>
             <a:r>
-              <a:rPr lang="en-US" dirty="0" smtClean="0"/>
+              <a:rPr lang="en-US" dirty="0" smtClean="0">
+                <a:cs typeface="Gill Sans SemiBold"/>
+              </a:rPr>
               <a:t>NetCDF-4 </a:t>
             </a:r>
             <a:r>
               <a:rPr lang="en-US" dirty="0" smtClean="0">
-                <a:latin typeface="Calibri Italic" charset="0"/>
-                <a:cs typeface="Calibri Italic" charset="0"/>
+                <a:cs typeface="Gill Sans SemiBold"/>
                 <a:sym typeface="Calibri Italic" charset="0"/>
               </a:rPr>
               <a:t>enhanced data model</a:t>
             </a:r>
-            <a:endParaRPr lang="en-US" dirty="0" smtClean="0">
-              <a:latin typeface="Calibri Italic" charset="0"/>
-              <a:sym typeface="Calibri Italic" charset="0"/>
-            </a:endParaRPr>
           </a:p>
         </p:txBody>
       </p:sp>
@@ -21410,19 +21590,33 @@
         </p:nvSpPr>
         <p:spPr/>
         <p:txBody>
-          <a:bodyPr/>
+          <a:bodyPr>
+            <a:normAutofit fontScale="90000"/>
+          </a:bodyPr>
           <a:lstStyle/>
           <a:p>
             <a:r>
+              <a:rPr lang="en-US" dirty="0"/>
+              <a:t>N</a:t>
+            </a:r>
+            <a:r>
               <a:rPr lang="en-US" dirty="0" smtClean="0"/>
-              <a:t>netCDF utilities</a:t>
+              <a:t>etCDF </a:t>
+            </a:r>
+            <a:r>
+              <a:rPr lang="en-US" dirty="0" smtClean="0"/>
+              <a:t>utilities</a:t>
             </a:r>
             <a:br>
               <a:rPr lang="en-US" dirty="0" smtClean="0"/>
             </a:br>
             <a:r>
               <a:rPr lang="en-US" dirty="0" smtClean="0"/>
-              <a:t>(netCDF without programming)</a:t>
+              <a:t>(or netCDF </a:t>
+            </a:r>
+            <a:r>
+              <a:rPr lang="en-US" dirty="0" smtClean="0"/>
+              <a:t>without programming)</a:t>
             </a:r>
             <a:endParaRPr lang="en-US" dirty="0"/>
           </a:p>
@@ -25273,7 +25467,7 @@
               <a:t>[-o </a:t>
             </a:r>
             <a:r>
-              <a:rPr lang="en-US" sz="2000" dirty="0" err="1">
+              <a:rPr lang="en-US" sz="2000" i="1" dirty="0" err="1">
                 <a:solidFill>
                   <a:schemeClr val="tx1"/>
                 </a:solidFill>
@@ -25354,7 +25548,31 @@
                 <a:cs typeface="Courier" charset="0"/>
                 <a:sym typeface="Courier" charset="0"/>
               </a:rPr>
-              <a:t>l   c | java]   </a:t>
+              <a:t>l   </a:t>
+            </a:r>
+            <a:r>
+              <a:rPr lang="en-US" sz="2000" i="1" dirty="0" err="1" smtClean="0">
+                <a:solidFill>
+                  <a:schemeClr val="tx1"/>
+                </a:solidFill>
+                <a:latin typeface="Gill Sans"/>
+                <a:ea typeface="ＭＳ Ｐゴシック" charset="0"/>
+                <a:cs typeface="Courier" charset="0"/>
+                <a:sym typeface="Courier" charset="0"/>
+              </a:rPr>
+              <a:t>lang</a:t>
+            </a:r>
+            <a:r>
+              <a:rPr lang="en-US" sz="2000" dirty="0" smtClean="0">
+                <a:solidFill>
+                  <a:schemeClr val="tx1"/>
+                </a:solidFill>
+                <a:latin typeface="Gill Sans"/>
+                <a:ea typeface="ＭＳ Ｐゴシック" charset="0"/>
+                <a:cs typeface="Courier" charset="0"/>
+                <a:sym typeface="Courier" charset="0"/>
+              </a:rPr>
+              <a:t>]   </a:t>
             </a:r>
             <a:r>
               <a:rPr lang="en-US" sz="2000" i="1" dirty="0" err="1" smtClean="0">
@@ -28064,13 +28282,21 @@
         </p:spPr>
         <p:txBody>
           <a:bodyPr rIns="132080">
-            <a:normAutofit fontScale="90000"/>
+            <a:normAutofit/>
           </a:bodyPr>
           <a:lstStyle/>
           <a:p>
             <a:r>
               <a:rPr lang="en-US" dirty="0"/>
-              <a:t>More of using ncgen and ncdump together</a:t>
+              <a:t>U</a:t>
+            </a:r>
+            <a:r>
+              <a:rPr lang="en-US" dirty="0" smtClean="0"/>
+              <a:t>sing </a:t>
+            </a:r>
+            <a:r>
+              <a:rPr lang="en-US" dirty="0"/>
+              <a:t>ncgen and ncdump together</a:t>
             </a:r>
           </a:p>
         </p:txBody>
@@ -30597,7 +30823,7 @@
               <a:t>   [</a:t>
             </a:r>
             <a:r>
-              <a:rPr lang="en-US" sz="2000" dirty="0">
+              <a:rPr lang="en-US" sz="2000" dirty="0" smtClean="0">
                 <a:solidFill>
                   <a:schemeClr val="tx1"/>
                 </a:solidFill>
@@ -30606,10 +30832,10 @@
                 <a:cs typeface="Courier" charset="0"/>
                 <a:sym typeface="Courier" charset="0"/>
               </a:rPr>
-              <a:t>-k </a:t>
-            </a:r>
-            <a:r>
-              <a:rPr lang="en-US" sz="2000" i="1" dirty="0" smtClean="0">
+              <a:t>-</a:t>
+            </a:r>
+            <a:r>
+              <a:rPr lang="en-US" sz="2000" i="1" dirty="0" err="1" smtClean="0">
                 <a:solidFill>
                   <a:schemeClr val="tx1"/>
                 </a:solidFill>
@@ -30618,7 +30844,7 @@
                 <a:cs typeface="Courier" charset="0"/>
                 <a:sym typeface="Courier" charset="0"/>
               </a:rPr>
-              <a:t>kind</a:t>
+              <a:t>kind_num</a:t>
             </a:r>
             <a:r>
               <a:rPr lang="en-US" sz="2000" dirty="0" smtClean="0">
@@ -30816,7 +31042,7 @@
               <a:t>[</a:t>
             </a:r>
             <a:r>
-              <a:rPr lang="en-US" sz="2000" dirty="0">
+              <a:rPr lang="en-US" sz="2000" dirty="0" smtClean="0">
                 <a:solidFill>
                   <a:schemeClr val="tx1"/>
                 </a:solidFill>
@@ -30825,10 +31051,10 @@
                 <a:cs typeface="Courier" charset="0"/>
                 <a:sym typeface="Courier" charset="0"/>
               </a:rPr>
-              <a:t>-k </a:t>
-            </a:r>
-            <a:r>
-              <a:rPr lang="en-US" sz="2000" i="1" dirty="0" smtClean="0">
+              <a:t>-</a:t>
+            </a:r>
+            <a:r>
+              <a:rPr lang="en-US" sz="2000" i="1" dirty="0" err="1" smtClean="0">
                 <a:solidFill>
                   <a:schemeClr val="tx1"/>
                 </a:solidFill>
@@ -30837,7 +31063,7 @@
                 <a:cs typeface="Courier" charset="0"/>
                 <a:sym typeface="Courier" charset="0"/>
               </a:rPr>
-              <a:t>kind</a:t>
+              <a:t>kind_num</a:t>
             </a:r>
             <a:r>
               <a:rPr lang="en-US" sz="2000" dirty="0" smtClean="0">
@@ -30849,10 +31075,10 @@
                 <a:cs typeface="Courier" charset="0"/>
                 <a:sym typeface="Courier" charset="0"/>
               </a:rPr>
-              <a:t>]	kind </a:t>
-            </a:r>
-            <a:r>
-              <a:rPr lang="en-US" sz="2000" dirty="0">
+              <a:t>]	</a:t>
+            </a:r>
+            <a:r>
+              <a:rPr lang="en-US" sz="2000" dirty="0" smtClean="0">
                 <a:solidFill>
                   <a:schemeClr val="tx1"/>
                 </a:solidFill>
@@ -30861,7 +31087,7 @@
                 <a:cs typeface="Courier" charset="0"/>
                 <a:sym typeface="Courier" charset="0"/>
               </a:rPr>
-              <a:t>of </a:t>
+              <a:t>-3, -4, -6, -7 </a:t>
             </a:r>
             <a:r>
               <a:rPr lang="en-US" sz="2000" dirty="0" smtClean="0">
@@ -30873,7 +31099,7 @@
                 <a:cs typeface="Courier" charset="0"/>
                 <a:sym typeface="Courier" charset="0"/>
               </a:rPr>
-              <a:t>output netCDF, </a:t>
+              <a:t>kind </a:t>
             </a:r>
             <a:r>
               <a:rPr lang="en-US" sz="2000" dirty="0">
@@ -30885,11 +31111,8 @@
                 <a:cs typeface="Courier" charset="0"/>
                 <a:sym typeface="Courier" charset="0"/>
               </a:rPr>
-              <a:t>default same as input</a:t>
-            </a:r>
-          </a:p>
-          <a:p>
-            <a:pPr marL="39688"/>
+              <a:t>of </a:t>
+            </a:r>
             <a:r>
               <a:rPr lang="en-US" sz="2000" dirty="0">
                 <a:solidFill>
@@ -30900,7 +31123,7 @@
                 <a:cs typeface="Courier" charset="0"/>
                 <a:sym typeface="Courier" charset="0"/>
               </a:rPr>
-              <a:t>[-u</a:t>
+              <a:t>netCDF </a:t>
             </a:r>
             <a:r>
               <a:rPr lang="en-US" sz="2000" dirty="0" smtClean="0">
@@ -30912,7 +31135,7 @@
                 <a:cs typeface="Courier" charset="0"/>
                 <a:sym typeface="Courier" charset="0"/>
               </a:rPr>
-              <a:t>]		convert </a:t>
+              <a:t>output, </a:t>
             </a:r>
             <a:r>
               <a:rPr lang="en-US" sz="2000" dirty="0">
@@ -30924,13 +31147,13 @@
                 <a:cs typeface="Courier" charset="0"/>
                 <a:sym typeface="Courier" charset="0"/>
               </a:rPr>
-              <a:t>unlimited dimensions to fixed-size in output</a:t>
+              <a:t>default same as input</a:t>
             </a:r>
           </a:p>
           <a:p>
             <a:pPr marL="39688"/>
             <a:r>
-              <a:rPr lang="en-US" sz="2000" dirty="0" smtClean="0">
+              <a:rPr lang="en-US" sz="2000" dirty="0">
                 <a:solidFill>
                   <a:schemeClr val="tx1"/>
                 </a:solidFill>
@@ -30939,10 +31162,10 @@
                 <a:cs typeface="Courier" charset="0"/>
                 <a:sym typeface="Courier" charset="0"/>
               </a:rPr>
-              <a:t>[</a:t>
-            </a:r>
-            <a:r>
-              <a:rPr lang="en-US" sz="2000" dirty="0">
+              <a:t>[-u</a:t>
+            </a:r>
+            <a:r>
+              <a:rPr lang="en-US" sz="2000" dirty="0" smtClean="0">
                 <a:solidFill>
                   <a:schemeClr val="tx1"/>
                 </a:solidFill>
@@ -30951,10 +31174,10 @@
                 <a:cs typeface="Courier" charset="0"/>
                 <a:sym typeface="Courier" charset="0"/>
               </a:rPr>
-              <a:t>-d </a:t>
-            </a:r>
-            <a:r>
-              <a:rPr lang="en-US" sz="2000" i="1" dirty="0" smtClean="0">
+              <a:t>]		convert </a:t>
+            </a:r>
+            <a:r>
+              <a:rPr lang="en-US" sz="2000" dirty="0">
                 <a:solidFill>
                   <a:schemeClr val="tx1"/>
                 </a:solidFill>
@@ -30963,8 +31186,11 @@
                 <a:cs typeface="Courier" charset="0"/>
                 <a:sym typeface="Courier" charset="0"/>
               </a:rPr>
-              <a:t>level</a:t>
-            </a:r>
+              <a:t>unlimited dimensions to fixed-size in output</a:t>
+            </a:r>
+          </a:p>
+          <a:p>
+            <a:pPr marL="39688"/>
             <a:r>
               <a:rPr lang="en-US" sz="2000" dirty="0" smtClean="0">
                 <a:solidFill>
@@ -30975,7 +31201,55 @@
                 <a:cs typeface="Courier" charset="0"/>
                 <a:sym typeface="Courier" charset="0"/>
               </a:rPr>
+              <a:t>[</a:t>
+            </a:r>
+            <a:r>
+              <a:rPr lang="en-US" sz="2000" dirty="0">
+                <a:solidFill>
+                  <a:schemeClr val="tx1"/>
+                </a:solidFill>
+                <a:latin typeface="Gill Sans"/>
+                <a:ea typeface="ＭＳ Ｐゴシック" charset="0"/>
+                <a:cs typeface="Courier" charset="0"/>
+                <a:sym typeface="Courier" charset="0"/>
+              </a:rPr>
+              <a:t>-d </a:t>
+            </a:r>
+            <a:r>
+              <a:rPr lang="en-US" sz="2000" i="1" dirty="0" smtClean="0">
+                <a:solidFill>
+                  <a:schemeClr val="tx1"/>
+                </a:solidFill>
+                <a:latin typeface="Gill Sans"/>
+                <a:ea typeface="ＭＳ Ｐゴシック" charset="0"/>
+                <a:cs typeface="Courier" charset="0"/>
+                <a:sym typeface="Courier" charset="0"/>
+              </a:rPr>
+              <a:t>level</a:t>
+            </a:r>
+            <a:r>
+              <a:rPr lang="en-US" sz="2000" dirty="0" smtClean="0">
+                <a:solidFill>
+                  <a:schemeClr val="tx1"/>
+                </a:solidFill>
+                <a:latin typeface="Gill Sans"/>
+                <a:ea typeface="ＭＳ Ｐゴシック" charset="0"/>
+                <a:cs typeface="Courier" charset="0"/>
+                <a:sym typeface="Courier" charset="0"/>
+              </a:rPr>
               <a:t>]	</a:t>
+            </a:r>
+            <a:r>
+              <a:rPr lang="en-US" sz="2000" dirty="0" smtClean="0">
+                <a:solidFill>
+                  <a:schemeClr val="tx1"/>
+                </a:solidFill>
+                <a:latin typeface="Gill Sans"/>
+                <a:ea typeface="ＭＳ Ｐゴシック" charset="0"/>
+                <a:cs typeface="Courier" charset="0"/>
+                <a:sym typeface="Courier" charset="0"/>
+              </a:rPr>
+              <a:t>	</a:t>
             </a:r>
             <a:r>
               <a:rPr lang="en-US" sz="2000" dirty="0" err="1" smtClean="0">
@@ -32155,8 +32429,8 @@
           </p:nvSpPr>
           <p:spPr bwMode="auto">
             <a:xfrm>
-              <a:off x="1387" y="73"/>
-              <a:ext cx="961" cy="240"/>
+              <a:off x="1462" y="73"/>
+              <a:ext cx="811" cy="174"/>
             </a:xfrm>
             <a:prstGeom prst="rect">
               <a:avLst/>
@@ -32193,7 +32467,7 @@
             <a:p>
               <a:pPr marL="39688" algn="ctr"/>
               <a:r>
-                <a:rPr lang="en-US" sz="1800" b="1">
+                <a:rPr lang="en-US" sz="1800" b="1" dirty="0" err="1">
                   <a:solidFill>
                     <a:schemeClr val="tx1"/>
                   </a:solidFill>
@@ -32202,8 +32476,41 @@
                   <a:cs typeface="Courier" charset="0"/>
                   <a:sym typeface="Courier" charset="0"/>
                 </a:rPr>
-                <a:t>nccopy -k1</a:t>
+                <a:t>nccopy</a:t>
               </a:r>
+              <a:r>
+                <a:rPr lang="en-US" sz="1800" b="1" dirty="0">
+                  <a:solidFill>
+                    <a:schemeClr val="tx1"/>
+                  </a:solidFill>
+                  <a:latin typeface="Courier" charset="0"/>
+                  <a:ea typeface="ＭＳ Ｐゴシック" charset="0"/>
+                  <a:cs typeface="Courier" charset="0"/>
+                  <a:sym typeface="Courier" charset="0"/>
+                </a:rPr>
+                <a:t> </a:t>
+              </a:r>
+              <a:r>
+                <a:rPr lang="en-US" sz="1800" b="1" dirty="0" smtClean="0">
+                  <a:solidFill>
+                    <a:schemeClr val="tx1"/>
+                  </a:solidFill>
+                  <a:latin typeface="Courier" charset="0"/>
+                  <a:ea typeface="ＭＳ Ｐゴシック" charset="0"/>
+                  <a:cs typeface="Courier" charset="0"/>
+                  <a:sym typeface="Courier" charset="0"/>
+                </a:rPr>
+                <a:t>-3</a:t>
+              </a:r>
+              <a:endParaRPr lang="en-US" sz="1800" b="1" dirty="0">
+                <a:solidFill>
+                  <a:schemeClr val="tx1"/>
+                </a:solidFill>
+                <a:latin typeface="Courier" charset="0"/>
+                <a:ea typeface="ＭＳ Ｐゴシック" charset="0"/>
+                <a:cs typeface="Courier" charset="0"/>
+                <a:sym typeface="Courier" charset="0"/>
+              </a:endParaRPr>
             </a:p>
           </p:txBody>
         </p:sp>
@@ -32336,8 +32643,16 @@
           <a:lstStyle/>
           <a:p>
             <a:r>
+              <a:rPr lang="en-US" dirty="0"/>
+              <a:t>N</a:t>
+            </a:r>
+            <a:r>
               <a:rPr lang="en-US" dirty="0" smtClean="0"/>
-              <a:t>netCDF exercises</a:t>
+              <a:t>etCDF </a:t>
+            </a:r>
+            <a:r>
+              <a:rPr lang="en-US" dirty="0" smtClean="0"/>
+              <a:t>exercises</a:t>
             </a:r>
             <a:endParaRPr lang="en-US" dirty="0"/>
           </a:p>
@@ -34765,7 +35080,7 @@
         </p:spPr>
         <p:txBody>
           <a:bodyPr>
-            <a:normAutofit lnSpcReduction="10000"/>
+            <a:normAutofit/>
           </a:bodyPr>
           <a:lstStyle/>
           <a:p>
@@ -34802,110 +35117,142 @@
             </a:r>
             <a:r>
               <a:rPr lang="en-US" dirty="0" smtClean="0"/>
-              <a:t>continue to support</a:t>
-            </a:r>
+              <a:t>continue to </a:t>
+            </a:r>
+            <a:r>
+              <a:rPr lang="en-US" dirty="0" smtClean="0"/>
+              <a:t>support</a:t>
+            </a:r>
+            <a:endParaRPr lang="en-US" dirty="0" smtClean="0"/>
+          </a:p>
+          <a:p>
+            <a:pPr lvl="1"/>
+            <a:r>
+              <a:rPr lang="en-US" sz="2700" dirty="0" smtClean="0"/>
+              <a:t>All previous netCDF formats and their variants</a:t>
+            </a:r>
+          </a:p>
+          <a:p>
+            <a:pPr lvl="1"/>
+            <a:r>
+              <a:rPr lang="en-US" sz="2700" dirty="0" smtClean="0"/>
+              <a:t>All </a:t>
+            </a:r>
+            <a:r>
+              <a:rPr lang="en-US" sz="2700" dirty="0"/>
+              <a:t>previous netCDF data models</a:t>
+            </a:r>
+          </a:p>
+          <a:p>
+            <a:pPr lvl="1"/>
+            <a:r>
+              <a:rPr lang="en-US" sz="2700" dirty="0" smtClean="0"/>
+              <a:t>All </a:t>
+            </a:r>
+            <a:r>
+              <a:rPr lang="en-US" sz="2700" dirty="0"/>
+              <a:t>previous </a:t>
+            </a:r>
+            <a:r>
+              <a:rPr lang="en-US" sz="2700" dirty="0" smtClean="0"/>
+              <a:t>APIs</a:t>
+            </a:r>
+            <a:r>
+              <a:rPr lang="en-US" sz="2700" baseline="30000" dirty="0" smtClean="0">
+                <a:latin typeface="Arial"/>
+                <a:cs typeface="Arial"/>
+              </a:rPr>
+              <a:t>1</a:t>
+            </a:r>
+          </a:p>
+          <a:p>
+            <a:pPr lvl="1"/>
+            <a:r>
+              <a:rPr lang="en-US" sz="2700" dirty="0"/>
+              <a:t>NetCDF data written </a:t>
+            </a:r>
+            <a:r>
+              <a:rPr lang="en-US" sz="2700" dirty="0" smtClean="0"/>
+              <a:t>using one language </a:t>
+            </a:r>
+            <a:r>
+              <a:rPr lang="en-US" sz="2700" dirty="0"/>
+              <a:t>API is readable through other language APIs. </a:t>
+            </a:r>
+            <a:r>
+              <a:rPr lang="en-US" sz="2700" baseline="30000" dirty="0">
+                <a:latin typeface="Arial"/>
+                <a:cs typeface="Arial"/>
+              </a:rPr>
+              <a:t>2</a:t>
+            </a:r>
+            <a:r>
+              <a:rPr lang="en-US" sz="2700" dirty="0"/>
+              <a:t> </a:t>
+            </a:r>
+            <a:r>
+              <a:rPr lang="en-US" sz="2700" dirty="0" smtClean="0"/>
+              <a:t>  </a:t>
+            </a:r>
+            <a:endParaRPr lang="en-US" sz="2700" dirty="0" smtClean="0"/>
           </a:p>
           <a:p>
             <a:pPr marL="0" indent="0">
               <a:buNone/>
             </a:pPr>
-            <a:endParaRPr lang="en-US" dirty="0" smtClean="0"/>
-          </a:p>
-          <a:p>
-            <a:r>
-              <a:rPr lang="en-US" dirty="0" smtClean="0"/>
-              <a:t>All previous netCDF formats and their variants</a:t>
-            </a:r>
-          </a:p>
-          <a:p>
-            <a:r>
-              <a:rPr lang="en-US" dirty="0" smtClean="0"/>
-              <a:t>All </a:t>
-            </a:r>
-            <a:r>
-              <a:rPr lang="en-US" dirty="0"/>
-              <a:t>previous netCDF data models</a:t>
-            </a:r>
-          </a:p>
-          <a:p>
-            <a:r>
-              <a:rPr lang="en-US" dirty="0" smtClean="0"/>
-              <a:t>All </a:t>
-            </a:r>
-            <a:r>
-              <a:rPr lang="en-US" dirty="0"/>
-              <a:t>previous APIs*  </a:t>
-            </a:r>
-            <a:endParaRPr lang="en-US" dirty="0" smtClean="0"/>
+            <a:r>
+              <a:rPr lang="en-US" sz="1200" dirty="0"/>
+              <a:t> </a:t>
+            </a:r>
+            <a:r>
+              <a:rPr lang="en-US" sz="1200" dirty="0" smtClean="0"/>
+              <a:t>        </a:t>
+            </a:r>
+            <a:endParaRPr lang="en-US" sz="1200" dirty="0" smtClean="0"/>
           </a:p>
           <a:p>
             <a:pPr marL="0" indent="0">
               <a:buNone/>
             </a:pPr>
             <a:r>
-              <a:rPr lang="en-US" sz="1200" dirty="0"/>
-              <a:t> </a:t>
-            </a:r>
-            <a:r>
-              <a:rPr lang="en-US" sz="1200" dirty="0" smtClean="0"/>
-              <a:t>         *Disclaimer: exceptions for bugs, early releases, documented experiments</a:t>
-            </a:r>
+              <a:rPr lang="en-US" sz="1400" baseline="30000" dirty="0" smtClean="0">
+                <a:latin typeface="Arial"/>
+                <a:cs typeface="Arial"/>
+              </a:rPr>
+              <a:t>1</a:t>
+            </a:r>
+            <a:r>
+              <a:rPr lang="en-US" sz="1400" dirty="0" smtClean="0"/>
+              <a:t>Disclaimer</a:t>
+            </a:r>
+            <a:r>
+              <a:rPr lang="en-US" sz="1400" dirty="0"/>
+              <a:t>: exceptions for bugs, early releases, documented </a:t>
+            </a:r>
+            <a:r>
+              <a:rPr lang="en-US" sz="1400" dirty="0" smtClean="0"/>
+              <a:t>experiments</a:t>
+            </a:r>
+            <a:endParaRPr lang="en-US" sz="1300" dirty="0" smtClean="0"/>
           </a:p>
           <a:p>
             <a:pPr marL="0" indent="0">
               <a:buNone/>
             </a:pPr>
-            <a:endParaRPr lang="en-US" dirty="0"/>
-          </a:p>
-          <a:p>
-            <a:pPr marL="0" indent="0">
-              <a:buNone/>
-            </a:pPr>
-            <a:r>
-              <a:rPr lang="en-US" dirty="0"/>
-              <a:t>Also, netCDF </a:t>
-            </a:r>
-            <a:r>
-              <a:rPr lang="en-US" dirty="0" smtClean="0"/>
-              <a:t>data written </a:t>
-            </a:r>
-            <a:r>
-              <a:rPr lang="en-US" dirty="0"/>
-              <a:t>with </a:t>
-            </a:r>
-            <a:r>
-              <a:rPr lang="en-US" dirty="0" smtClean="0"/>
-              <a:t>any </a:t>
-            </a:r>
-            <a:r>
-              <a:rPr lang="en-US" dirty="0"/>
-              <a:t>language API </a:t>
-            </a:r>
-            <a:r>
-              <a:rPr lang="en-US" dirty="0" smtClean="0"/>
-              <a:t>is readable </a:t>
-            </a:r>
-            <a:r>
-              <a:rPr lang="en-US" dirty="0"/>
-              <a:t>through </a:t>
-            </a:r>
-            <a:r>
-              <a:rPr lang="en-US" dirty="0" smtClean="0"/>
-              <a:t>other </a:t>
-            </a:r>
-            <a:r>
-              <a:rPr lang="en-US" dirty="0"/>
-              <a:t>language APIs. * </a:t>
-            </a:r>
-            <a:endParaRPr lang="en-US" dirty="0" smtClean="0"/>
-          </a:p>
-          <a:p>
-            <a:pPr marL="0" indent="0">
-              <a:buNone/>
-            </a:pPr>
+            <a:r>
+              <a:rPr lang="en-US" sz="1300" baseline="30000" dirty="0" smtClean="0">
+                <a:latin typeface="Arial"/>
+                <a:cs typeface="Arial"/>
+              </a:rPr>
+              <a:t>2</a:t>
+            </a:r>
             <a:r>
               <a:rPr lang="en-US" sz="1300" dirty="0" smtClean="0"/>
-              <a:t>*Exception: currently some advanced netCDF-4 features are only available from C and Fortran APIs</a:t>
+              <a:t>Exception</a:t>
+            </a:r>
+            <a:r>
+              <a:rPr lang="en-US" sz="1300" dirty="0" smtClean="0"/>
+              <a:t>: currently some advanced netCDF-4 features are only available from C and Fortran APIs</a:t>
             </a:r>
             <a:endParaRPr lang="en-US" sz="1300" dirty="0"/>
           </a:p>

</xml_diff>